<commit_message>
Created final model summary tables, updated presentation and report w/ them
</commit_message>
<xml_diff>
--- a/Project1/Reports/Project 1 Final Presentation.pptx
+++ b/Project1/Reports/Project 1 Final Presentation.pptx
@@ -9,7 +9,9 @@
     <p:sldId id="257" r:id="rId3"/>
     <p:sldId id="262" r:id="rId4"/>
     <p:sldId id="263" r:id="rId5"/>
-    <p:sldId id="264" r:id="rId6"/>
+    <p:sldId id="265" r:id="rId6"/>
+    <p:sldId id="266" r:id="rId7"/>
+    <p:sldId id="267" r:id="rId8"/>
   </p:sldIdLst>
   <p:sldSz cx="12192000" cy="6858000"/>
   <p:notesSz cx="6858000" cy="9144000"/>
@@ -312,7 +314,7 @@
           <a:p>
             <a:fld id="{1051E915-BC91-4BD6-BC90-BCDFE094BF0D}" type="datetimeFigureOut">
               <a:rPr lang="en-US" smtClean="0"/>
-              <a:t>10/7/2017</a:t>
+              <a:t>10/8/2017</a:t>
             </a:fld>
             <a:endParaRPr lang="en-US"/>
           </a:p>
@@ -533,7 +535,7 @@
           <a:p>
             <a:fld id="{1051E915-BC91-4BD6-BC90-BCDFE094BF0D}" type="datetimeFigureOut">
               <a:rPr lang="en-US" smtClean="0"/>
-              <a:t>10/7/2017</a:t>
+              <a:t>10/8/2017</a:t>
             </a:fld>
             <a:endParaRPr lang="en-US"/>
           </a:p>
@@ -713,7 +715,7 @@
           <a:p>
             <a:fld id="{1051E915-BC91-4BD6-BC90-BCDFE094BF0D}" type="datetimeFigureOut">
               <a:rPr lang="en-US" smtClean="0"/>
-              <a:t>10/7/2017</a:t>
+              <a:t>10/8/2017</a:t>
             </a:fld>
             <a:endParaRPr lang="en-US"/>
           </a:p>
@@ -883,7 +885,7 @@
           <a:p>
             <a:fld id="{1051E915-BC91-4BD6-BC90-BCDFE094BF0D}" type="datetimeFigureOut">
               <a:rPr lang="en-US" smtClean="0"/>
-              <a:t>10/7/2017</a:t>
+              <a:t>10/8/2017</a:t>
             </a:fld>
             <a:endParaRPr lang="en-US"/>
           </a:p>
@@ -1134,7 +1136,7 @@
           <a:p>
             <a:fld id="{1051E915-BC91-4BD6-BC90-BCDFE094BF0D}" type="datetimeFigureOut">
               <a:rPr lang="en-US" smtClean="0"/>
-              <a:t>10/7/2017</a:t>
+              <a:t>10/8/2017</a:t>
             </a:fld>
             <a:endParaRPr lang="en-US"/>
           </a:p>
@@ -1457,7 +1459,7 @@
           <a:p>
             <a:fld id="{1051E915-BC91-4BD6-BC90-BCDFE094BF0D}" type="datetimeFigureOut">
               <a:rPr lang="en-US" smtClean="0"/>
-              <a:t>10/7/2017</a:t>
+              <a:t>10/8/2017</a:t>
             </a:fld>
             <a:endParaRPr lang="en-US"/>
           </a:p>
@@ -1881,7 +1883,7 @@
           <a:p>
             <a:fld id="{1051E915-BC91-4BD6-BC90-BCDFE094BF0D}" type="datetimeFigureOut">
               <a:rPr lang="en-US" smtClean="0"/>
-              <a:t>10/7/2017</a:t>
+              <a:t>10/8/2017</a:t>
             </a:fld>
             <a:endParaRPr lang="en-US"/>
           </a:p>
@@ -1999,7 +2001,7 @@
           <a:p>
             <a:fld id="{1051E915-BC91-4BD6-BC90-BCDFE094BF0D}" type="datetimeFigureOut">
               <a:rPr lang="en-US" smtClean="0"/>
-              <a:t>10/7/2017</a:t>
+              <a:t>10/8/2017</a:t>
             </a:fld>
             <a:endParaRPr lang="en-US"/>
           </a:p>
@@ -2094,7 +2096,7 @@
           <a:p>
             <a:fld id="{1051E915-BC91-4BD6-BC90-BCDFE094BF0D}" type="datetimeFigureOut">
               <a:rPr lang="en-US" smtClean="0"/>
-              <a:t>10/7/2017</a:t>
+              <a:t>10/8/2017</a:t>
             </a:fld>
             <a:endParaRPr lang="en-US"/>
           </a:p>
@@ -2384,7 +2386,7 @@
           <a:p>
             <a:fld id="{1051E915-BC91-4BD6-BC90-BCDFE094BF0D}" type="datetimeFigureOut">
               <a:rPr lang="en-US" smtClean="0"/>
-              <a:t>10/7/2017</a:t>
+              <a:t>10/8/2017</a:t>
             </a:fld>
             <a:endParaRPr lang="en-US"/>
           </a:p>
@@ -2656,7 +2658,7 @@
           <a:p>
             <a:fld id="{1051E915-BC91-4BD6-BC90-BCDFE094BF0D}" type="datetimeFigureOut">
               <a:rPr lang="en-US" smtClean="0"/>
-              <a:t>10/7/2017</a:t>
+              <a:t>10/8/2017</a:t>
             </a:fld>
             <a:endParaRPr lang="en-US"/>
           </a:p>
@@ -2909,7 +2911,7 @@
           <a:p>
             <a:fld id="{1051E915-BC91-4BD6-BC90-BCDFE094BF0D}" type="datetimeFigureOut">
               <a:rPr lang="en-US" smtClean="0"/>
-              <a:t>10/7/2017</a:t>
+              <a:t>10/8/2017</a:t>
             </a:fld>
             <a:endParaRPr lang="en-US"/>
           </a:p>
@@ -3557,29 +3559,8 @@
             </a:r>
             <a:r>
               <a:rPr lang="en-US" sz="2800" dirty="0" smtClean="0"/>
-              <a:t> </a:t>
-            </a:r>
-            <a:r>
-              <a:rPr lang="en-US" sz="2800" dirty="0" smtClean="0"/>
-              <a:t>outcome value, age</a:t>
-            </a:r>
-            <a:r>
-              <a:rPr lang="en-US" sz="2800" dirty="0" smtClean="0"/>
-              <a:t>, BMI, alcohol use (13 or fewer vs. &gt;13 drinks), smoking status (never/former vs. current), income level (&lt;$10,000, $10,000-$40,000, &gt;$40,000), education (</a:t>
-            </a:r>
-            <a:r>
-              <a:rPr lang="en-US" sz="2800" dirty="0" smtClean="0"/>
-              <a:t>HS </a:t>
-            </a:r>
-            <a:r>
-              <a:rPr lang="en-US" sz="2800" dirty="0" smtClean="0"/>
-              <a:t>or less, &gt;</a:t>
-            </a:r>
-            <a:r>
-              <a:rPr lang="en-US" sz="2800" dirty="0" smtClean="0"/>
-              <a:t>HS)</a:t>
-            </a:r>
-            <a:endParaRPr lang="en-US" sz="2800" dirty="0" smtClean="0"/>
+              <a:t> outcome value, age, BMI, alcohol use (13 or fewer vs. &gt;13 drinks), smoking status (never/former vs. current), income level (&lt;$10,000, $10,000-$40,000, &gt;$40,000), education (HS or less, &gt;HS)</a:t>
+            </a:r>
           </a:p>
           <a:p>
             <a:pPr lvl="1"/>
@@ -3795,8 +3776,12 @@
           <a:p>
             <a:pPr lvl="1"/>
             <a:r>
+              <a:rPr lang="en-US" dirty="0" smtClean="0"/>
+              <a:t>Parameters (3 of 4 models): </a:t>
+            </a:r>
+            <a:r>
               <a:rPr lang="en-US" dirty="0"/>
-              <a:t>Parameters: ~normal(mean = 0, variance = 1000)</a:t>
+              <a:t>~normal(mean = 0, variance = 1000)</a:t>
             </a:r>
           </a:p>
           <a:p>
@@ -3809,8 +3794,12 @@
           <a:p>
             <a:pPr lvl="1"/>
             <a:r>
+              <a:rPr lang="en-US" dirty="0" smtClean="0"/>
+              <a:t>Parameters (CD4 outcome): </a:t>
+            </a:r>
+            <a:r>
               <a:rPr lang="en-US" dirty="0"/>
-              <a:t>Intercept and drug use in CD4+ model: ~normal(mean = 0, variance = 10000</a:t>
+              <a:t>~normal(mean = 0, variance = 10000</a:t>
             </a:r>
             <a:r>
               <a:rPr lang="en-US" dirty="0" smtClean="0"/>
@@ -3876,48 +3865,1571 @@
           <a:chExt cx="0" cy="0"/>
         </a:xfrm>
       </p:grpSpPr>
-      <p:sp>
-        <p:nvSpPr>
-          <p:cNvPr id="2" name="Title 1"/>
-          <p:cNvSpPr>
-            <a:spLocks noGrp="1"/>
-          </p:cNvSpPr>
-          <p:nvPr>
-            <p:ph type="title"/>
-          </p:nvPr>
-        </p:nvSpPr>
-        <p:spPr/>
-        <p:txBody>
-          <a:bodyPr/>
+      <p:graphicFrame>
+        <p:nvGraphicFramePr>
+          <p:cNvPr id="4" name="Content Placeholder 3"/>
+          <p:cNvGraphicFramePr>
+            <a:graphicFrameLocks noGrp="1"/>
+          </p:cNvGraphicFramePr>
+          <p:nvPr>
+            <p:ph idx="1"/>
+            <p:extLst>
+              <p:ext uri="{D42A27DB-BD31-4B8C-83A1-F6EECF244321}">
+                <p14:modId xmlns:p14="http://schemas.microsoft.com/office/powerpoint/2010/main" val="4064336311"/>
+              </p:ext>
+            </p:extLst>
+          </p:nvPr>
+        </p:nvGraphicFramePr>
+        <p:xfrm>
+          <a:off x="900114" y="671512"/>
+          <a:ext cx="10244138" cy="4791077"/>
+        </p:xfrm>
+        <a:graphic>
+          <a:graphicData uri="http://schemas.openxmlformats.org/drawingml/2006/table">
+            <a:tbl>
+              <a:tblPr/>
+              <a:tblGrid>
+                <a:gridCol w="3543299">
+                  <a:extLst>
+                    <a:ext uri="{9D8B030D-6E8A-4147-A177-3AD203B41FA5}">
+                      <a16:colId xmlns:a16="http://schemas.microsoft.com/office/drawing/2014/main" val="2366302935"/>
+                    </a:ext>
+                  </a:extLst>
+                </a:gridCol>
+                <a:gridCol w="2903383">
+                  <a:extLst>
+                    <a:ext uri="{9D8B030D-6E8A-4147-A177-3AD203B41FA5}">
+                      <a16:colId xmlns:a16="http://schemas.microsoft.com/office/drawing/2014/main" val="3055982440"/>
+                    </a:ext>
+                  </a:extLst>
+                </a:gridCol>
+                <a:gridCol w="3797456">
+                  <a:extLst>
+                    <a:ext uri="{9D8B030D-6E8A-4147-A177-3AD203B41FA5}">
+                      <a16:colId xmlns:a16="http://schemas.microsoft.com/office/drawing/2014/main" val="2471108020"/>
+                    </a:ext>
+                  </a:extLst>
+                </a:gridCol>
+              </a:tblGrid>
+              <a:tr h="1371601">
+                <a:tc>
+                  <a:txBody>
+                    <a:bodyPr/>
+                    <a:lstStyle/>
+                    <a:p>
+                      <a:pPr algn="ctr" fontAlgn="ctr"/>
+                      <a:r>
+                        <a:rPr lang="en-US" sz="2800" b="1" i="0" u="none" strike="noStrike" dirty="0" smtClean="0">
+                          <a:solidFill>
+                            <a:srgbClr val="000000"/>
+                          </a:solidFill>
+                          <a:effectLst/>
+                          <a:latin typeface="Times New Roman" panose="02020603050405020304" pitchFamily="18" charset="0"/>
+                        </a:rPr>
+                        <a:t>Quality of</a:t>
+                      </a:r>
+                      <a:r>
+                        <a:rPr lang="en-US" sz="2800" b="1" i="0" u="none" strike="noStrike" baseline="0" dirty="0" smtClean="0">
+                          <a:solidFill>
+                            <a:srgbClr val="000000"/>
+                          </a:solidFill>
+                          <a:effectLst/>
+                          <a:latin typeface="Times New Roman" panose="02020603050405020304" pitchFamily="18" charset="0"/>
+                        </a:rPr>
+                        <a:t> Life Difference </a:t>
+                      </a:r>
+                      <a:r>
+                        <a:rPr lang="en-US" sz="2800" b="1" i="0" u="none" strike="noStrike" dirty="0" smtClean="0">
+                          <a:solidFill>
+                            <a:srgbClr val="000000"/>
+                          </a:solidFill>
+                          <a:effectLst/>
+                          <a:latin typeface="Times New Roman" panose="02020603050405020304" pitchFamily="18" charset="0"/>
+                        </a:rPr>
+                        <a:t>Outcome</a:t>
+                      </a:r>
+                      <a:endParaRPr lang="en-US" sz="2800" b="1" i="0" u="none" strike="noStrike" dirty="0">
+                        <a:solidFill>
+                          <a:srgbClr val="000000"/>
+                        </a:solidFill>
+                        <a:effectLst/>
+                        <a:latin typeface="Times New Roman" panose="02020603050405020304" pitchFamily="18" charset="0"/>
+                      </a:endParaRPr>
+                    </a:p>
+                  </a:txBody>
+                  <a:tcPr marL="9525" marR="9525" marT="9525" marB="0" anchor="ctr">
+                    <a:lnL>
+                      <a:noFill/>
+                    </a:lnL>
+                    <a:lnR w="6350" cap="flat" cmpd="sng" algn="ctr">
+                      <a:solidFill>
+                        <a:srgbClr val="000000"/>
+                      </a:solidFill>
+                      <a:prstDash val="solid"/>
+                      <a:round/>
+                      <a:headEnd type="none" w="med" len="med"/>
+                      <a:tailEnd type="none" w="med" len="med"/>
+                    </a:lnR>
+                    <a:lnT>
+                      <a:noFill/>
+                    </a:lnT>
+                    <a:lnB w="6350" cap="flat" cmpd="sng" algn="ctr">
+                      <a:solidFill>
+                        <a:srgbClr val="000000"/>
+                      </a:solidFill>
+                      <a:prstDash val="solid"/>
+                      <a:round/>
+                      <a:headEnd type="none" w="med" len="med"/>
+                      <a:tailEnd type="none" w="med" len="med"/>
+                    </a:lnB>
+                  </a:tcPr>
+                </a:tc>
+                <a:tc>
+                  <a:txBody>
+                    <a:bodyPr/>
+                    <a:lstStyle/>
+                    <a:p>
+                      <a:pPr algn="ctr" fontAlgn="ctr"/>
+                      <a:r>
+                        <a:rPr lang="en-US" sz="2800" b="1" i="0" u="none" strike="noStrike" dirty="0">
+                          <a:solidFill>
+                            <a:srgbClr val="000000"/>
+                          </a:solidFill>
+                          <a:effectLst/>
+                          <a:latin typeface="Times New Roman" panose="02020603050405020304" pitchFamily="18" charset="0"/>
+                        </a:rPr>
+                        <a:t>Hard drug           posterior mean</a:t>
+                      </a:r>
+                    </a:p>
+                  </a:txBody>
+                  <a:tcPr marL="9525" marR="9525" marT="9525" marB="0" anchor="ctr">
+                    <a:lnL w="6350" cap="flat" cmpd="sng" algn="ctr">
+                      <a:solidFill>
+                        <a:srgbClr val="000000"/>
+                      </a:solidFill>
+                      <a:prstDash val="solid"/>
+                      <a:round/>
+                      <a:headEnd type="none" w="med" len="med"/>
+                      <a:tailEnd type="none" w="med" len="med"/>
+                    </a:lnL>
+                    <a:lnR>
+                      <a:noFill/>
+                    </a:lnR>
+                    <a:lnT>
+                      <a:noFill/>
+                    </a:lnT>
+                    <a:lnB w="6350" cap="flat" cmpd="sng" algn="ctr">
+                      <a:solidFill>
+                        <a:srgbClr val="000000"/>
+                      </a:solidFill>
+                      <a:prstDash val="solid"/>
+                      <a:round/>
+                      <a:headEnd type="none" w="med" len="med"/>
+                      <a:tailEnd type="none" w="med" len="med"/>
+                    </a:lnB>
+                  </a:tcPr>
+                </a:tc>
+                <a:tc>
+                  <a:txBody>
+                    <a:bodyPr/>
+                    <a:lstStyle/>
+                    <a:p>
+                      <a:pPr algn="ctr" fontAlgn="ctr"/>
+                      <a:r>
+                        <a:rPr lang="en-US" sz="2800" b="1" i="0" u="none" strike="noStrike" dirty="0">
+                          <a:solidFill>
+                            <a:srgbClr val="000000"/>
+                          </a:solidFill>
+                          <a:effectLst/>
+                          <a:latin typeface="Times New Roman" panose="02020603050405020304" pitchFamily="18" charset="0"/>
+                        </a:rPr>
+                        <a:t>Hard drug                      </a:t>
+                      </a:r>
+                      <a:r>
+                        <a:rPr lang="en-US" sz="2800" b="1" i="0" u="none" strike="noStrike" dirty="0" smtClean="0">
+                          <a:solidFill>
+                            <a:srgbClr val="000000"/>
+                          </a:solidFill>
+                          <a:effectLst/>
+                          <a:latin typeface="Times New Roman" panose="02020603050405020304" pitchFamily="18" charset="0"/>
+                        </a:rPr>
+                        <a:t>   95</a:t>
+                      </a:r>
+                      <a:r>
+                        <a:rPr lang="en-US" sz="2800" b="1" i="0" u="none" strike="noStrike" dirty="0">
+                          <a:solidFill>
+                            <a:srgbClr val="000000"/>
+                          </a:solidFill>
+                          <a:effectLst/>
+                          <a:latin typeface="Times New Roman" panose="02020603050405020304" pitchFamily="18" charset="0"/>
+                        </a:rPr>
+                        <a:t>% HPD interval</a:t>
+                      </a:r>
+                    </a:p>
+                  </a:txBody>
+                  <a:tcPr marL="9525" marR="9525" marT="9525" marB="0" anchor="ctr">
+                    <a:lnL>
+                      <a:noFill/>
+                    </a:lnL>
+                    <a:lnR>
+                      <a:noFill/>
+                    </a:lnR>
+                    <a:lnT>
+                      <a:noFill/>
+                    </a:lnT>
+                    <a:lnB w="6350" cap="flat" cmpd="sng" algn="ctr">
+                      <a:solidFill>
+                        <a:srgbClr val="000000"/>
+                      </a:solidFill>
+                      <a:prstDash val="solid"/>
+                      <a:round/>
+                      <a:headEnd type="none" w="med" len="med"/>
+                      <a:tailEnd type="none" w="med" len="med"/>
+                    </a:lnB>
+                  </a:tcPr>
+                </a:tc>
+                <a:extLst>
+                  <a:ext uri="{0D108BD9-81ED-4DB2-BD59-A6C34878D82A}">
+                    <a16:rowId xmlns:a16="http://schemas.microsoft.com/office/drawing/2014/main" val="101376799"/>
+                  </a:ext>
+                </a:extLst>
+              </a:tr>
+              <a:tr h="854869">
+                <a:tc>
+                  <a:txBody>
+                    <a:bodyPr/>
+                    <a:lstStyle/>
+                    <a:p>
+                      <a:pPr algn="l" fontAlgn="ctr"/>
+                      <a:r>
+                        <a:rPr lang="en-US" sz="2800" b="0" i="0" u="none" strike="noStrike">
+                          <a:solidFill>
+                            <a:srgbClr val="000000"/>
+                          </a:solidFill>
+                          <a:effectLst/>
+                          <a:latin typeface="Times New Roman" panose="02020603050405020304" pitchFamily="18" charset="0"/>
+                        </a:rPr>
+                        <a:t>SF-36 MCS (Mental)*</a:t>
+                      </a:r>
+                    </a:p>
+                  </a:txBody>
+                  <a:tcPr marL="9525" marR="9525" marT="9525" marB="0" anchor="ctr">
+                    <a:lnL>
+                      <a:noFill/>
+                    </a:lnL>
+                    <a:lnR w="6350" cap="flat" cmpd="sng" algn="ctr">
+                      <a:solidFill>
+                        <a:srgbClr val="000000"/>
+                      </a:solidFill>
+                      <a:prstDash val="solid"/>
+                      <a:round/>
+                      <a:headEnd type="none" w="med" len="med"/>
+                      <a:tailEnd type="none" w="med" len="med"/>
+                    </a:lnR>
+                    <a:lnT w="6350" cap="flat" cmpd="sng" algn="ctr">
+                      <a:solidFill>
+                        <a:srgbClr val="000000"/>
+                      </a:solidFill>
+                      <a:prstDash val="solid"/>
+                      <a:round/>
+                      <a:headEnd type="none" w="med" len="med"/>
+                      <a:tailEnd type="none" w="med" len="med"/>
+                    </a:lnT>
+                    <a:lnB>
+                      <a:noFill/>
+                    </a:lnB>
+                    <a:solidFill>
+                      <a:srgbClr val="F2F2F2"/>
+                    </a:solidFill>
+                  </a:tcPr>
+                </a:tc>
+                <a:tc>
+                  <a:txBody>
+                    <a:bodyPr/>
+                    <a:lstStyle/>
+                    <a:p>
+                      <a:pPr algn="ctr" fontAlgn="ctr"/>
+                      <a:r>
+                        <a:rPr lang="en-US" sz="2800" b="0" i="0" u="none" strike="noStrike">
+                          <a:solidFill>
+                            <a:srgbClr val="000000"/>
+                          </a:solidFill>
+                          <a:effectLst/>
+                          <a:latin typeface="Times New Roman" panose="02020603050405020304" pitchFamily="18" charset="0"/>
+                        </a:rPr>
+                        <a:t>-0.2167</a:t>
+                      </a:r>
+                    </a:p>
+                  </a:txBody>
+                  <a:tcPr marL="9525" marR="9525" marT="9525" marB="0" anchor="ctr">
+                    <a:lnL w="6350" cap="flat" cmpd="sng" algn="ctr">
+                      <a:solidFill>
+                        <a:srgbClr val="000000"/>
+                      </a:solidFill>
+                      <a:prstDash val="solid"/>
+                      <a:round/>
+                      <a:headEnd type="none" w="med" len="med"/>
+                      <a:tailEnd type="none" w="med" len="med"/>
+                    </a:lnL>
+                    <a:lnR>
+                      <a:noFill/>
+                    </a:lnR>
+                    <a:lnT w="6350" cap="flat" cmpd="sng" algn="ctr">
+                      <a:solidFill>
+                        <a:srgbClr val="000000"/>
+                      </a:solidFill>
+                      <a:prstDash val="solid"/>
+                      <a:round/>
+                      <a:headEnd type="none" w="med" len="med"/>
+                      <a:tailEnd type="none" w="med" len="med"/>
+                    </a:lnT>
+                    <a:lnB>
+                      <a:noFill/>
+                    </a:lnB>
+                    <a:solidFill>
+                      <a:srgbClr val="F2F2F2"/>
+                    </a:solidFill>
+                  </a:tcPr>
+                </a:tc>
+                <a:tc>
+                  <a:txBody>
+                    <a:bodyPr/>
+                    <a:lstStyle/>
+                    <a:p>
+                      <a:pPr algn="ctr" fontAlgn="ctr"/>
+                      <a:r>
+                        <a:rPr lang="en-US" sz="2800" b="0" i="0" u="none" strike="noStrike">
+                          <a:solidFill>
+                            <a:srgbClr val="000000"/>
+                          </a:solidFill>
+                          <a:effectLst/>
+                          <a:latin typeface="Times New Roman" panose="02020603050405020304" pitchFamily="18" charset="0"/>
+                        </a:rPr>
+                        <a:t>-3.4630, 3.33566</a:t>
+                      </a:r>
+                    </a:p>
+                  </a:txBody>
+                  <a:tcPr marL="9525" marR="9525" marT="9525" marB="0" anchor="ctr">
+                    <a:lnL>
+                      <a:noFill/>
+                    </a:lnL>
+                    <a:lnR>
+                      <a:noFill/>
+                    </a:lnR>
+                    <a:lnT w="6350" cap="flat" cmpd="sng" algn="ctr">
+                      <a:solidFill>
+                        <a:srgbClr val="000000"/>
+                      </a:solidFill>
+                      <a:prstDash val="solid"/>
+                      <a:round/>
+                      <a:headEnd type="none" w="med" len="med"/>
+                      <a:tailEnd type="none" w="med" len="med"/>
+                    </a:lnT>
+                    <a:lnB>
+                      <a:noFill/>
+                    </a:lnB>
+                    <a:solidFill>
+                      <a:srgbClr val="F2F2F2"/>
+                    </a:solidFill>
+                  </a:tcPr>
+                </a:tc>
+                <a:extLst>
+                  <a:ext uri="{0D108BD9-81ED-4DB2-BD59-A6C34878D82A}">
+                    <a16:rowId xmlns:a16="http://schemas.microsoft.com/office/drawing/2014/main" val="2840718993"/>
+                  </a:ext>
+                </a:extLst>
+              </a:tr>
+              <a:tr h="854869">
+                <a:tc>
+                  <a:txBody>
+                    <a:bodyPr/>
+                    <a:lstStyle/>
+                    <a:p>
+                      <a:pPr algn="l" fontAlgn="ctr"/>
+                      <a:r>
+                        <a:rPr lang="en-US" sz="2800" b="0" i="0" u="none" strike="noStrike">
+                          <a:solidFill>
+                            <a:srgbClr val="000000"/>
+                          </a:solidFill>
+                          <a:effectLst/>
+                          <a:latin typeface="Times New Roman" panose="02020603050405020304" pitchFamily="18" charset="0"/>
+                        </a:rPr>
+                        <a:t>SF-36 PCS (Physical)*</a:t>
+                      </a:r>
+                    </a:p>
+                  </a:txBody>
+                  <a:tcPr marL="9525" marR="9525" marT="9525" marB="0" anchor="ctr">
+                    <a:lnL>
+                      <a:noFill/>
+                    </a:lnL>
+                    <a:lnR w="6350" cap="flat" cmpd="sng" algn="ctr">
+                      <a:solidFill>
+                        <a:srgbClr val="000000"/>
+                      </a:solidFill>
+                      <a:prstDash val="solid"/>
+                      <a:round/>
+                      <a:headEnd type="none" w="med" len="med"/>
+                      <a:tailEnd type="none" w="med" len="med"/>
+                    </a:lnR>
+                    <a:lnT>
+                      <a:noFill/>
+                    </a:lnT>
+                    <a:lnB>
+                      <a:noFill/>
+                    </a:lnB>
+                  </a:tcPr>
+                </a:tc>
+                <a:tc>
+                  <a:txBody>
+                    <a:bodyPr/>
+                    <a:lstStyle/>
+                    <a:p>
+                      <a:pPr algn="ctr" fontAlgn="ctr"/>
+                      <a:r>
+                        <a:rPr lang="en-US" sz="2800" b="0" i="0" u="none" strike="noStrike">
+                          <a:solidFill>
+                            <a:srgbClr val="000000"/>
+                          </a:solidFill>
+                          <a:effectLst/>
+                          <a:latin typeface="Times New Roman" panose="02020603050405020304" pitchFamily="18" charset="0"/>
+                        </a:rPr>
+                        <a:t>-3.6128</a:t>
+                      </a:r>
+                    </a:p>
+                  </a:txBody>
+                  <a:tcPr marL="9525" marR="9525" marT="9525" marB="0" anchor="ctr">
+                    <a:lnL w="6350" cap="flat" cmpd="sng" algn="ctr">
+                      <a:solidFill>
+                        <a:srgbClr val="000000"/>
+                      </a:solidFill>
+                      <a:prstDash val="solid"/>
+                      <a:round/>
+                      <a:headEnd type="none" w="med" len="med"/>
+                      <a:tailEnd type="none" w="med" len="med"/>
+                    </a:lnL>
+                    <a:lnR>
+                      <a:noFill/>
+                    </a:lnR>
+                    <a:lnT>
+                      <a:noFill/>
+                    </a:lnT>
+                    <a:lnB>
+                      <a:noFill/>
+                    </a:lnB>
+                  </a:tcPr>
+                </a:tc>
+                <a:tc>
+                  <a:txBody>
+                    <a:bodyPr/>
+                    <a:lstStyle/>
+                    <a:p>
+                      <a:pPr algn="ctr" fontAlgn="ctr"/>
+                      <a:r>
+                        <a:rPr lang="en-US" sz="2800" b="0" i="0" u="none" strike="noStrike">
+                          <a:solidFill>
+                            <a:srgbClr val="000000"/>
+                          </a:solidFill>
+                          <a:effectLst/>
+                          <a:latin typeface="Times New Roman" panose="02020603050405020304" pitchFamily="18" charset="0"/>
+                        </a:rPr>
+                        <a:t>-5.9669, -0.8246</a:t>
+                      </a:r>
+                    </a:p>
+                  </a:txBody>
+                  <a:tcPr marL="9525" marR="9525" marT="9525" marB="0" anchor="ctr">
+                    <a:lnL>
+                      <a:noFill/>
+                    </a:lnL>
+                    <a:lnR>
+                      <a:noFill/>
+                    </a:lnR>
+                    <a:lnT>
+                      <a:noFill/>
+                    </a:lnT>
+                    <a:lnB>
+                      <a:noFill/>
+                    </a:lnB>
+                  </a:tcPr>
+                </a:tc>
+                <a:extLst>
+                  <a:ext uri="{0D108BD9-81ED-4DB2-BD59-A6C34878D82A}">
+                    <a16:rowId xmlns:a16="http://schemas.microsoft.com/office/drawing/2014/main" val="4172455402"/>
+                  </a:ext>
+                </a:extLst>
+              </a:tr>
+              <a:tr h="854869">
+                <a:tc>
+                  <a:txBody>
+                    <a:bodyPr/>
+                    <a:lstStyle/>
+                    <a:p>
+                      <a:pPr algn="l" fontAlgn="ctr"/>
+                      <a:endParaRPr lang="en-US" sz="2800" b="0" i="0" u="none" strike="noStrike" dirty="0">
+                        <a:solidFill>
+                          <a:srgbClr val="000000"/>
+                        </a:solidFill>
+                        <a:effectLst/>
+                        <a:latin typeface="Times New Roman" panose="02020603050405020304" pitchFamily="18" charset="0"/>
+                      </a:endParaRPr>
+                    </a:p>
+                  </a:txBody>
+                  <a:tcPr marL="9525" marR="9525" marT="9525" marB="0" anchor="ctr">
+                    <a:lnL>
+                      <a:noFill/>
+                    </a:lnL>
+                    <a:lnR w="6350" cap="flat" cmpd="sng" algn="ctr">
+                      <a:solidFill>
+                        <a:srgbClr val="000000"/>
+                      </a:solidFill>
+                      <a:prstDash val="solid"/>
+                      <a:round/>
+                      <a:headEnd type="none" w="med" len="med"/>
+                      <a:tailEnd type="none" w="med" len="med"/>
+                    </a:lnR>
+                    <a:lnT>
+                      <a:noFill/>
+                    </a:lnT>
+                    <a:lnB>
+                      <a:noFill/>
+                    </a:lnB>
+                    <a:solidFill>
+                      <a:srgbClr val="F2F2F2"/>
+                    </a:solidFill>
+                  </a:tcPr>
+                </a:tc>
+                <a:tc>
+                  <a:txBody>
+                    <a:bodyPr/>
+                    <a:lstStyle/>
+                    <a:p>
+                      <a:pPr algn="ctr" fontAlgn="ctr"/>
+                      <a:endParaRPr lang="en-US" sz="2800" b="0" i="0" u="none" strike="noStrike" dirty="0">
+                        <a:solidFill>
+                          <a:srgbClr val="000000"/>
+                        </a:solidFill>
+                        <a:effectLst/>
+                        <a:latin typeface="Times New Roman" panose="02020603050405020304" pitchFamily="18" charset="0"/>
+                      </a:endParaRPr>
+                    </a:p>
+                  </a:txBody>
+                  <a:tcPr marL="9525" marR="9525" marT="9525" marB="0" anchor="ctr">
+                    <a:lnL w="6350" cap="flat" cmpd="sng" algn="ctr">
+                      <a:solidFill>
+                        <a:srgbClr val="000000"/>
+                      </a:solidFill>
+                      <a:prstDash val="solid"/>
+                      <a:round/>
+                      <a:headEnd type="none" w="med" len="med"/>
+                      <a:tailEnd type="none" w="med" len="med"/>
+                    </a:lnL>
+                    <a:lnR>
+                      <a:noFill/>
+                    </a:lnR>
+                    <a:lnT>
+                      <a:noFill/>
+                    </a:lnT>
+                    <a:lnB>
+                      <a:noFill/>
+                    </a:lnB>
+                    <a:solidFill>
+                      <a:srgbClr val="F2F2F2"/>
+                    </a:solidFill>
+                  </a:tcPr>
+                </a:tc>
+                <a:tc>
+                  <a:txBody>
+                    <a:bodyPr/>
+                    <a:lstStyle/>
+                    <a:p>
+                      <a:pPr algn="ctr" fontAlgn="ctr"/>
+                      <a:endParaRPr lang="en-US" sz="2800" b="0" i="0" u="none" strike="noStrike" dirty="0">
+                        <a:solidFill>
+                          <a:srgbClr val="000000"/>
+                        </a:solidFill>
+                        <a:effectLst/>
+                        <a:latin typeface="Times New Roman" panose="02020603050405020304" pitchFamily="18" charset="0"/>
+                      </a:endParaRPr>
+                    </a:p>
+                  </a:txBody>
+                  <a:tcPr marL="9525" marR="9525" marT="9525" marB="0" anchor="ctr">
+                    <a:lnL>
+                      <a:noFill/>
+                    </a:lnL>
+                    <a:lnR>
+                      <a:noFill/>
+                    </a:lnR>
+                    <a:lnT>
+                      <a:noFill/>
+                    </a:lnT>
+                    <a:lnB>
+                      <a:noFill/>
+                    </a:lnB>
+                    <a:solidFill>
+                      <a:srgbClr val="F2F2F2"/>
+                    </a:solidFill>
+                  </a:tcPr>
+                </a:tc>
+                <a:extLst>
+                  <a:ext uri="{0D108BD9-81ED-4DB2-BD59-A6C34878D82A}">
+                    <a16:rowId xmlns:a16="http://schemas.microsoft.com/office/drawing/2014/main" val="455590482"/>
+                  </a:ext>
+                </a:extLst>
+              </a:tr>
+              <a:tr h="854869">
+                <a:tc>
+                  <a:txBody>
+                    <a:bodyPr/>
+                    <a:lstStyle/>
+                    <a:p>
+                      <a:pPr algn="l" fontAlgn="ctr"/>
+                      <a:endParaRPr lang="en-US" sz="2800" b="0" i="0" u="none" strike="noStrike">
+                        <a:solidFill>
+                          <a:srgbClr val="000000"/>
+                        </a:solidFill>
+                        <a:effectLst/>
+                        <a:latin typeface="Times New Roman" panose="02020603050405020304" pitchFamily="18" charset="0"/>
+                      </a:endParaRPr>
+                    </a:p>
+                  </a:txBody>
+                  <a:tcPr marL="9525" marR="9525" marT="9525" marB="0" anchor="ctr">
+                    <a:lnL>
+                      <a:noFill/>
+                    </a:lnL>
+                    <a:lnR w="6350" cap="flat" cmpd="sng" algn="ctr">
+                      <a:solidFill>
+                        <a:srgbClr val="000000"/>
+                      </a:solidFill>
+                      <a:prstDash val="solid"/>
+                      <a:round/>
+                      <a:headEnd type="none" w="med" len="med"/>
+                      <a:tailEnd type="none" w="med" len="med"/>
+                    </a:lnR>
+                    <a:lnT>
+                      <a:noFill/>
+                    </a:lnT>
+                    <a:lnB w="6350" cap="flat" cmpd="sng" algn="ctr">
+                      <a:solidFill>
+                        <a:srgbClr val="000000"/>
+                      </a:solidFill>
+                      <a:prstDash val="solid"/>
+                      <a:round/>
+                      <a:headEnd type="none" w="med" len="med"/>
+                      <a:tailEnd type="none" w="med" len="med"/>
+                    </a:lnB>
+                  </a:tcPr>
+                </a:tc>
+                <a:tc>
+                  <a:txBody>
+                    <a:bodyPr/>
+                    <a:lstStyle/>
+                    <a:p>
+                      <a:pPr algn="ctr" fontAlgn="ctr"/>
+                      <a:endParaRPr lang="en-US" sz="2800" b="0" i="0" u="none" strike="noStrike" dirty="0">
+                        <a:solidFill>
+                          <a:srgbClr val="000000"/>
+                        </a:solidFill>
+                        <a:effectLst/>
+                        <a:latin typeface="Times New Roman" panose="02020603050405020304" pitchFamily="18" charset="0"/>
+                      </a:endParaRPr>
+                    </a:p>
+                  </a:txBody>
+                  <a:tcPr marL="9525" marR="9525" marT="9525" marB="0" anchor="ctr">
+                    <a:lnL w="6350" cap="flat" cmpd="sng" algn="ctr">
+                      <a:solidFill>
+                        <a:srgbClr val="000000"/>
+                      </a:solidFill>
+                      <a:prstDash val="solid"/>
+                      <a:round/>
+                      <a:headEnd type="none" w="med" len="med"/>
+                      <a:tailEnd type="none" w="med" len="med"/>
+                    </a:lnL>
+                    <a:lnR>
+                      <a:noFill/>
+                    </a:lnR>
+                    <a:lnT>
+                      <a:noFill/>
+                    </a:lnT>
+                    <a:lnB w="6350" cap="flat" cmpd="sng" algn="ctr">
+                      <a:solidFill>
+                        <a:srgbClr val="000000"/>
+                      </a:solidFill>
+                      <a:prstDash val="solid"/>
+                      <a:round/>
+                      <a:headEnd type="none" w="med" len="med"/>
+                      <a:tailEnd type="none" w="med" len="med"/>
+                    </a:lnB>
+                  </a:tcPr>
+                </a:tc>
+                <a:tc>
+                  <a:txBody>
+                    <a:bodyPr/>
+                    <a:lstStyle/>
+                    <a:p>
+                      <a:pPr algn="ctr" fontAlgn="ctr"/>
+                      <a:endParaRPr lang="en-US" sz="2800" b="0" i="0" u="none" strike="noStrike" dirty="0">
+                        <a:solidFill>
+                          <a:srgbClr val="000000"/>
+                        </a:solidFill>
+                        <a:effectLst/>
+                        <a:latin typeface="Times New Roman" panose="02020603050405020304" pitchFamily="18" charset="0"/>
+                      </a:endParaRPr>
+                    </a:p>
+                  </a:txBody>
+                  <a:tcPr marL="9525" marR="9525" marT="9525" marB="0" anchor="ctr">
+                    <a:lnL>
+                      <a:noFill/>
+                    </a:lnL>
+                    <a:lnR>
+                      <a:noFill/>
+                    </a:lnR>
+                    <a:lnT>
+                      <a:noFill/>
+                    </a:lnT>
+                    <a:lnB w="6350" cap="flat" cmpd="sng" algn="ctr">
+                      <a:solidFill>
+                        <a:srgbClr val="000000"/>
+                      </a:solidFill>
+                      <a:prstDash val="solid"/>
+                      <a:round/>
+                      <a:headEnd type="none" w="med" len="med"/>
+                      <a:tailEnd type="none" w="med" len="med"/>
+                    </a:lnB>
+                  </a:tcPr>
+                </a:tc>
+                <a:extLst>
+                  <a:ext uri="{0D108BD9-81ED-4DB2-BD59-A6C34878D82A}">
+                    <a16:rowId xmlns:a16="http://schemas.microsoft.com/office/drawing/2014/main" val="2578682642"/>
+                  </a:ext>
+                </a:extLst>
+              </a:tr>
+            </a:tbl>
+          </a:graphicData>
+        </a:graphic>
+      </p:graphicFrame>
+      <p:sp>
+        <p:nvSpPr>
+          <p:cNvPr id="7" name="Rectangle 6"/>
+          <p:cNvSpPr/>
+          <p:nvPr/>
+        </p:nvSpPr>
+        <p:spPr>
+          <a:xfrm>
+            <a:off x="471488" y="3700463"/>
+            <a:ext cx="10972800" cy="2043112"/>
+          </a:xfrm>
+          <a:prstGeom prst="rect">
+            <a:avLst/>
+          </a:prstGeom>
+          <a:solidFill>
+            <a:schemeClr val="bg1"/>
+          </a:solidFill>
+          <a:ln>
+            <a:solidFill>
+              <a:schemeClr val="bg1"/>
+            </a:solidFill>
+          </a:ln>
+        </p:spPr>
+        <p:style>
+          <a:lnRef idx="2">
+            <a:schemeClr val="accent1">
+              <a:shade val="50000"/>
+            </a:schemeClr>
+          </a:lnRef>
+          <a:fillRef idx="1">
+            <a:schemeClr val="accent1"/>
+          </a:fillRef>
+          <a:effectRef idx="0">
+            <a:schemeClr val="accent1"/>
+          </a:effectRef>
+          <a:fontRef idx="minor">
+            <a:schemeClr val="lt1"/>
+          </a:fontRef>
+        </p:style>
+        <p:txBody>
+          <a:bodyPr rtlCol="0" anchor="ctr"/>
           <a:lstStyle/>
           <a:p>
+            <a:pPr algn="ctr"/>
             <a:endParaRPr lang="en-US"/>
           </a:p>
         </p:txBody>
       </p:sp>
       <p:sp>
         <p:nvSpPr>
-          <p:cNvPr id="3" name="Content Placeholder 2"/>
-          <p:cNvSpPr>
-            <a:spLocks noGrp="1"/>
-          </p:cNvSpPr>
-          <p:nvPr>
-            <p:ph idx="1"/>
-          </p:nvPr>
-        </p:nvSpPr>
-        <p:spPr/>
-        <p:txBody>
-          <a:bodyPr/>
+          <p:cNvPr id="6" name="TextBox 5"/>
+          <p:cNvSpPr txBox="1"/>
+          <p:nvPr/>
+        </p:nvSpPr>
+        <p:spPr>
+          <a:xfrm>
+            <a:off x="900114" y="3700463"/>
+            <a:ext cx="10101264" cy="646331"/>
+          </a:xfrm>
+          <a:prstGeom prst="rect">
+            <a:avLst/>
+          </a:prstGeom>
+          <a:noFill/>
+        </p:spPr>
+        <p:txBody>
+          <a:bodyPr wrap="square" rtlCol="0">
+            <a:spAutoFit/>
+          </a:bodyPr>
           <a:lstStyle/>
           <a:p>
-            <a:endParaRPr lang="en-US"/>
+            <a:r>
+              <a:rPr lang="en-US" dirty="0"/>
+              <a:t>*Adjusted for baseline, age, BMI, ART adherence at 2 year mark, race, income</a:t>
+            </a:r>
+          </a:p>
+          <a:p>
+            <a:endParaRPr lang="en-US" dirty="0"/>
+          </a:p>
+        </p:txBody>
+      </p:sp>
+      <p:sp>
+        <p:nvSpPr>
+          <p:cNvPr id="8" name="TextBox 7"/>
+          <p:cNvSpPr txBox="1"/>
+          <p:nvPr/>
+        </p:nvSpPr>
+        <p:spPr>
+          <a:xfrm>
+            <a:off x="785813" y="4525864"/>
+            <a:ext cx="10787063" cy="1077218"/>
+          </a:xfrm>
+          <a:prstGeom prst="rect">
+            <a:avLst/>
+          </a:prstGeom>
+          <a:noFill/>
+        </p:spPr>
+        <p:txBody>
+          <a:bodyPr wrap="square" rtlCol="0">
+            <a:spAutoFit/>
+          </a:bodyPr>
+          <a:lstStyle/>
+          <a:p>
+            <a:pPr marL="285750" indent="-285750">
+              <a:buFont typeface="Arial" panose="020B0604020202020204" pitchFamily="34" charset="0"/>
+              <a:buChar char="•"/>
+            </a:pPr>
+            <a:r>
+              <a:rPr lang="en-US" sz="3200" dirty="0" smtClean="0"/>
+              <a:t>Hard drug not a strong predictor of difference in SF-36 MCS</a:t>
+            </a:r>
+          </a:p>
+          <a:p>
+            <a:pPr marL="285750" indent="-285750">
+              <a:buFont typeface="Arial" panose="020B0604020202020204" pitchFamily="34" charset="0"/>
+              <a:buChar char="•"/>
+            </a:pPr>
+            <a:r>
+              <a:rPr lang="en-US" sz="3200" dirty="0" smtClean="0"/>
+              <a:t>Hard drug much stronger predictor of difference in SF-36 PCS</a:t>
+            </a:r>
+            <a:endParaRPr lang="en-US" sz="3200" dirty="0"/>
           </a:p>
         </p:txBody>
       </p:sp>
     </p:spTree>
     <p:extLst>
       <p:ext uri="{BB962C8B-B14F-4D97-AF65-F5344CB8AC3E}">
-        <p14:creationId xmlns:p14="http://schemas.microsoft.com/office/powerpoint/2010/main" val="2740715209"/>
+        <p14:creationId xmlns:p14="http://schemas.microsoft.com/office/powerpoint/2010/main" val="1978947362"/>
+      </p:ext>
+    </p:extLst>
+  </p:cSld>
+  <p:clrMapOvr>
+    <a:masterClrMapping/>
+  </p:clrMapOvr>
+</p:sld>
+</file>
+
+<file path=ppt/slides/slide6.xml><?xml version="1.0" encoding="utf-8"?>
+<p:sld xmlns:a="http://schemas.openxmlformats.org/drawingml/2006/main" xmlns:r="http://schemas.openxmlformats.org/officeDocument/2006/relationships" xmlns:p="http://schemas.openxmlformats.org/presentationml/2006/main">
+  <p:cSld>
+    <p:spTree>
+      <p:nvGrpSpPr>
+        <p:cNvPr id="1" name=""/>
+        <p:cNvGrpSpPr/>
+        <p:nvPr/>
+      </p:nvGrpSpPr>
+      <p:grpSpPr>
+        <a:xfrm>
+          <a:off x="0" y="0"/>
+          <a:ext cx="0" cy="0"/>
+          <a:chOff x="0" y="0"/>
+          <a:chExt cx="0" cy="0"/>
+        </a:xfrm>
+      </p:grpSpPr>
+      <p:graphicFrame>
+        <p:nvGraphicFramePr>
+          <p:cNvPr id="4" name="Content Placeholder 3"/>
+          <p:cNvGraphicFramePr>
+            <a:graphicFrameLocks noGrp="1"/>
+          </p:cNvGraphicFramePr>
+          <p:nvPr>
+            <p:ph idx="1"/>
+            <p:extLst>
+              <p:ext uri="{D42A27DB-BD31-4B8C-83A1-F6EECF244321}">
+                <p14:modId xmlns:p14="http://schemas.microsoft.com/office/powerpoint/2010/main" val="3893992675"/>
+              </p:ext>
+            </p:extLst>
+          </p:nvPr>
+        </p:nvGraphicFramePr>
+        <p:xfrm>
+          <a:off x="900114" y="585787"/>
+          <a:ext cx="10244138" cy="3081339"/>
+        </p:xfrm>
+        <a:graphic>
+          <a:graphicData uri="http://schemas.openxmlformats.org/drawingml/2006/table">
+            <a:tbl>
+              <a:tblPr/>
+              <a:tblGrid>
+                <a:gridCol w="3543299">
+                  <a:extLst>
+                    <a:ext uri="{9D8B030D-6E8A-4147-A177-3AD203B41FA5}">
+                      <a16:colId xmlns:a16="http://schemas.microsoft.com/office/drawing/2014/main" val="2366302935"/>
+                    </a:ext>
+                  </a:extLst>
+                </a:gridCol>
+                <a:gridCol w="2903383">
+                  <a:extLst>
+                    <a:ext uri="{9D8B030D-6E8A-4147-A177-3AD203B41FA5}">
+                      <a16:colId xmlns:a16="http://schemas.microsoft.com/office/drawing/2014/main" val="3055982440"/>
+                    </a:ext>
+                  </a:extLst>
+                </a:gridCol>
+                <a:gridCol w="3797456">
+                  <a:extLst>
+                    <a:ext uri="{9D8B030D-6E8A-4147-A177-3AD203B41FA5}">
+                      <a16:colId xmlns:a16="http://schemas.microsoft.com/office/drawing/2014/main" val="2471108020"/>
+                    </a:ext>
+                  </a:extLst>
+                </a:gridCol>
+              </a:tblGrid>
+              <a:tr h="1371601">
+                <a:tc>
+                  <a:txBody>
+                    <a:bodyPr/>
+                    <a:lstStyle/>
+                    <a:p>
+                      <a:pPr algn="ctr" fontAlgn="ctr"/>
+                      <a:r>
+                        <a:rPr lang="en-US" sz="2800" b="1" i="0" u="none" strike="noStrike" dirty="0" smtClean="0">
+                          <a:solidFill>
+                            <a:srgbClr val="000000"/>
+                          </a:solidFill>
+                          <a:effectLst/>
+                          <a:latin typeface="Times New Roman" panose="02020603050405020304" pitchFamily="18" charset="0"/>
+                        </a:rPr>
+                        <a:t>Laboratory   Difference Outcome</a:t>
+                      </a:r>
+                      <a:endParaRPr lang="en-US" sz="2800" b="1" i="0" u="none" strike="noStrike" dirty="0">
+                        <a:solidFill>
+                          <a:srgbClr val="000000"/>
+                        </a:solidFill>
+                        <a:effectLst/>
+                        <a:latin typeface="Times New Roman" panose="02020603050405020304" pitchFamily="18" charset="0"/>
+                      </a:endParaRPr>
+                    </a:p>
+                  </a:txBody>
+                  <a:tcPr marL="9525" marR="9525" marT="9525" marB="0" anchor="ctr">
+                    <a:lnL>
+                      <a:noFill/>
+                    </a:lnL>
+                    <a:lnR w="6350" cap="flat" cmpd="sng" algn="ctr">
+                      <a:solidFill>
+                        <a:srgbClr val="000000"/>
+                      </a:solidFill>
+                      <a:prstDash val="solid"/>
+                      <a:round/>
+                      <a:headEnd type="none" w="med" len="med"/>
+                      <a:tailEnd type="none" w="med" len="med"/>
+                    </a:lnR>
+                    <a:lnT>
+                      <a:noFill/>
+                    </a:lnT>
+                    <a:lnB w="6350" cap="flat" cmpd="sng" algn="ctr">
+                      <a:solidFill>
+                        <a:srgbClr val="000000"/>
+                      </a:solidFill>
+                      <a:prstDash val="solid"/>
+                      <a:round/>
+                      <a:headEnd type="none" w="med" len="med"/>
+                      <a:tailEnd type="none" w="med" len="med"/>
+                    </a:lnB>
+                  </a:tcPr>
+                </a:tc>
+                <a:tc>
+                  <a:txBody>
+                    <a:bodyPr/>
+                    <a:lstStyle/>
+                    <a:p>
+                      <a:pPr algn="ctr" fontAlgn="ctr"/>
+                      <a:r>
+                        <a:rPr lang="en-US" sz="2800" b="1" i="0" u="none" strike="noStrike" dirty="0">
+                          <a:solidFill>
+                            <a:srgbClr val="000000"/>
+                          </a:solidFill>
+                          <a:effectLst/>
+                          <a:latin typeface="Times New Roman" panose="02020603050405020304" pitchFamily="18" charset="0"/>
+                        </a:rPr>
+                        <a:t>Hard drug           posterior mean</a:t>
+                      </a:r>
+                    </a:p>
+                  </a:txBody>
+                  <a:tcPr marL="9525" marR="9525" marT="9525" marB="0" anchor="ctr">
+                    <a:lnL w="6350" cap="flat" cmpd="sng" algn="ctr">
+                      <a:solidFill>
+                        <a:srgbClr val="000000"/>
+                      </a:solidFill>
+                      <a:prstDash val="solid"/>
+                      <a:round/>
+                      <a:headEnd type="none" w="med" len="med"/>
+                      <a:tailEnd type="none" w="med" len="med"/>
+                    </a:lnL>
+                    <a:lnR>
+                      <a:noFill/>
+                    </a:lnR>
+                    <a:lnT>
+                      <a:noFill/>
+                    </a:lnT>
+                    <a:lnB w="6350" cap="flat" cmpd="sng" algn="ctr">
+                      <a:solidFill>
+                        <a:srgbClr val="000000"/>
+                      </a:solidFill>
+                      <a:prstDash val="solid"/>
+                      <a:round/>
+                      <a:headEnd type="none" w="med" len="med"/>
+                      <a:tailEnd type="none" w="med" len="med"/>
+                    </a:lnB>
+                  </a:tcPr>
+                </a:tc>
+                <a:tc>
+                  <a:txBody>
+                    <a:bodyPr/>
+                    <a:lstStyle/>
+                    <a:p>
+                      <a:pPr algn="ctr" fontAlgn="ctr"/>
+                      <a:r>
+                        <a:rPr lang="en-US" sz="2800" b="1" i="0" u="none" strike="noStrike" dirty="0">
+                          <a:solidFill>
+                            <a:srgbClr val="000000"/>
+                          </a:solidFill>
+                          <a:effectLst/>
+                          <a:latin typeface="Times New Roman" panose="02020603050405020304" pitchFamily="18" charset="0"/>
+                        </a:rPr>
+                        <a:t>Hard drug                      </a:t>
+                      </a:r>
+                      <a:r>
+                        <a:rPr lang="en-US" sz="2800" b="1" i="0" u="none" strike="noStrike" dirty="0" smtClean="0">
+                          <a:solidFill>
+                            <a:srgbClr val="000000"/>
+                          </a:solidFill>
+                          <a:effectLst/>
+                          <a:latin typeface="Times New Roman" panose="02020603050405020304" pitchFamily="18" charset="0"/>
+                        </a:rPr>
+                        <a:t>   95</a:t>
+                      </a:r>
+                      <a:r>
+                        <a:rPr lang="en-US" sz="2800" b="1" i="0" u="none" strike="noStrike" dirty="0">
+                          <a:solidFill>
+                            <a:srgbClr val="000000"/>
+                          </a:solidFill>
+                          <a:effectLst/>
+                          <a:latin typeface="Times New Roman" panose="02020603050405020304" pitchFamily="18" charset="0"/>
+                        </a:rPr>
+                        <a:t>% HPD interval</a:t>
+                      </a:r>
+                    </a:p>
+                  </a:txBody>
+                  <a:tcPr marL="9525" marR="9525" marT="9525" marB="0" anchor="ctr">
+                    <a:lnL>
+                      <a:noFill/>
+                    </a:lnL>
+                    <a:lnR>
+                      <a:noFill/>
+                    </a:lnR>
+                    <a:lnT>
+                      <a:noFill/>
+                    </a:lnT>
+                    <a:lnB w="6350" cap="flat" cmpd="sng" algn="ctr">
+                      <a:solidFill>
+                        <a:srgbClr val="000000"/>
+                      </a:solidFill>
+                      <a:prstDash val="solid"/>
+                      <a:round/>
+                      <a:headEnd type="none" w="med" len="med"/>
+                      <a:tailEnd type="none" w="med" len="med"/>
+                    </a:lnB>
+                  </a:tcPr>
+                </a:tc>
+                <a:extLst>
+                  <a:ext uri="{0D108BD9-81ED-4DB2-BD59-A6C34878D82A}">
+                    <a16:rowId xmlns:a16="http://schemas.microsoft.com/office/drawing/2014/main" val="101376799"/>
+                  </a:ext>
+                </a:extLst>
+              </a:tr>
+              <a:tr h="854869">
+                <a:tc>
+                  <a:txBody>
+                    <a:bodyPr/>
+                    <a:lstStyle/>
+                    <a:p>
+                      <a:pPr algn="l" fontAlgn="ctr"/>
+                      <a:r>
+                        <a:rPr lang="en-US" sz="2800" b="0" i="0" u="none" strike="noStrike">
+                          <a:solidFill>
+                            <a:srgbClr val="000000"/>
+                          </a:solidFill>
+                          <a:effectLst/>
+                          <a:latin typeface="Times New Roman" panose="02020603050405020304" pitchFamily="18" charset="0"/>
+                        </a:rPr>
+                        <a:t>Log10 Viral Load*</a:t>
+                      </a:r>
+                    </a:p>
+                  </a:txBody>
+                  <a:tcPr marL="9525" marR="9525" marT="9525" marB="0" anchor="ctr">
+                    <a:lnL>
+                      <a:noFill/>
+                    </a:lnL>
+                    <a:lnR w="6350" cap="flat" cmpd="sng" algn="ctr">
+                      <a:solidFill>
+                        <a:srgbClr val="000000"/>
+                      </a:solidFill>
+                      <a:prstDash val="solid"/>
+                      <a:round/>
+                      <a:headEnd type="none" w="med" len="med"/>
+                      <a:tailEnd type="none" w="med" len="med"/>
+                    </a:lnR>
+                    <a:lnT w="6350" cap="flat" cmpd="sng" algn="ctr">
+                      <a:solidFill>
+                        <a:srgbClr val="000000"/>
+                      </a:solidFill>
+                      <a:prstDash val="solid"/>
+                      <a:round/>
+                      <a:headEnd type="none" w="med" len="med"/>
+                      <a:tailEnd type="none" w="med" len="med"/>
+                    </a:lnT>
+                    <a:lnB>
+                      <a:noFill/>
+                    </a:lnB>
+                    <a:solidFill>
+                      <a:srgbClr val="F2F2F2"/>
+                    </a:solidFill>
+                  </a:tcPr>
+                </a:tc>
+                <a:tc>
+                  <a:txBody>
+                    <a:bodyPr/>
+                    <a:lstStyle/>
+                    <a:p>
+                      <a:pPr algn="ctr" fontAlgn="ctr"/>
+                      <a:r>
+                        <a:rPr lang="en-US" sz="2800" b="0" i="0" u="none" strike="noStrike">
+                          <a:solidFill>
+                            <a:srgbClr val="000000"/>
+                          </a:solidFill>
+                          <a:effectLst/>
+                          <a:latin typeface="Times New Roman" panose="02020603050405020304" pitchFamily="18" charset="0"/>
+                        </a:rPr>
+                        <a:t>-0.0363</a:t>
+                      </a:r>
+                    </a:p>
+                  </a:txBody>
+                  <a:tcPr marL="9525" marR="9525" marT="9525" marB="0" anchor="ctr">
+                    <a:lnL w="6350" cap="flat" cmpd="sng" algn="ctr">
+                      <a:solidFill>
+                        <a:srgbClr val="000000"/>
+                      </a:solidFill>
+                      <a:prstDash val="solid"/>
+                      <a:round/>
+                      <a:headEnd type="none" w="med" len="med"/>
+                      <a:tailEnd type="none" w="med" len="med"/>
+                    </a:lnL>
+                    <a:lnR>
+                      <a:noFill/>
+                    </a:lnR>
+                    <a:lnT w="6350" cap="flat" cmpd="sng" algn="ctr">
+                      <a:solidFill>
+                        <a:srgbClr val="000000"/>
+                      </a:solidFill>
+                      <a:prstDash val="solid"/>
+                      <a:round/>
+                      <a:headEnd type="none" w="med" len="med"/>
+                      <a:tailEnd type="none" w="med" len="med"/>
+                    </a:lnT>
+                    <a:lnB>
+                      <a:noFill/>
+                    </a:lnB>
+                    <a:solidFill>
+                      <a:srgbClr val="F2F2F2"/>
+                    </a:solidFill>
+                  </a:tcPr>
+                </a:tc>
+                <a:tc>
+                  <a:txBody>
+                    <a:bodyPr/>
+                    <a:lstStyle/>
+                    <a:p>
+                      <a:pPr algn="ctr" fontAlgn="ctr"/>
+                      <a:r>
+                        <a:rPr lang="en-US" sz="2800" b="0" i="0" u="none" strike="noStrike">
+                          <a:solidFill>
+                            <a:srgbClr val="000000"/>
+                          </a:solidFill>
+                          <a:effectLst/>
+                          <a:latin typeface="Times New Roman" panose="02020603050405020304" pitchFamily="18" charset="0"/>
+                        </a:rPr>
+                        <a:t>-0.1595, 0.1015</a:t>
+                      </a:r>
+                    </a:p>
+                  </a:txBody>
+                  <a:tcPr marL="9525" marR="9525" marT="9525" marB="0" anchor="ctr">
+                    <a:lnL>
+                      <a:noFill/>
+                    </a:lnL>
+                    <a:lnR>
+                      <a:noFill/>
+                    </a:lnR>
+                    <a:lnT w="6350" cap="flat" cmpd="sng" algn="ctr">
+                      <a:solidFill>
+                        <a:srgbClr val="000000"/>
+                      </a:solidFill>
+                      <a:prstDash val="solid"/>
+                      <a:round/>
+                      <a:headEnd type="none" w="med" len="med"/>
+                      <a:tailEnd type="none" w="med" len="med"/>
+                    </a:lnT>
+                    <a:lnB>
+                      <a:noFill/>
+                    </a:lnB>
+                    <a:solidFill>
+                      <a:srgbClr val="F2F2F2"/>
+                    </a:solidFill>
+                  </a:tcPr>
+                </a:tc>
+                <a:extLst>
+                  <a:ext uri="{0D108BD9-81ED-4DB2-BD59-A6C34878D82A}">
+                    <a16:rowId xmlns:a16="http://schemas.microsoft.com/office/drawing/2014/main" val="2840718993"/>
+                  </a:ext>
+                </a:extLst>
+              </a:tr>
+              <a:tr h="854869">
+                <a:tc>
+                  <a:txBody>
+                    <a:bodyPr/>
+                    <a:lstStyle/>
+                    <a:p>
+                      <a:pPr algn="l" fontAlgn="ctr"/>
+                      <a:r>
+                        <a:rPr lang="en-US" sz="2800" b="0" i="0" u="none" strike="noStrike">
+                          <a:solidFill>
+                            <a:srgbClr val="000000"/>
+                          </a:solidFill>
+                          <a:effectLst/>
+                          <a:latin typeface="Times New Roman" panose="02020603050405020304" pitchFamily="18" charset="0"/>
+                        </a:rPr>
+                        <a:t>CD4+ Count*</a:t>
+                      </a:r>
+                    </a:p>
+                  </a:txBody>
+                  <a:tcPr marL="9525" marR="9525" marT="9525" marB="0" anchor="ctr">
+                    <a:lnL>
+                      <a:noFill/>
+                    </a:lnL>
+                    <a:lnR w="6350" cap="flat" cmpd="sng" algn="ctr">
+                      <a:solidFill>
+                        <a:srgbClr val="000000"/>
+                      </a:solidFill>
+                      <a:prstDash val="solid"/>
+                      <a:round/>
+                      <a:headEnd type="none" w="med" len="med"/>
+                      <a:tailEnd type="none" w="med" len="med"/>
+                    </a:lnR>
+                    <a:lnT>
+                      <a:noFill/>
+                    </a:lnT>
+                    <a:lnB>
+                      <a:noFill/>
+                    </a:lnB>
+                  </a:tcPr>
+                </a:tc>
+                <a:tc>
+                  <a:txBody>
+                    <a:bodyPr/>
+                    <a:lstStyle/>
+                    <a:p>
+                      <a:pPr algn="ctr" fontAlgn="ctr"/>
+                      <a:r>
+                        <a:rPr lang="en-US" sz="2800" b="0" i="0" u="none" strike="noStrike" dirty="0">
+                          <a:solidFill>
+                            <a:srgbClr val="000000"/>
+                          </a:solidFill>
+                          <a:effectLst/>
+                          <a:latin typeface="Times New Roman" panose="02020603050405020304" pitchFamily="18" charset="0"/>
+                        </a:rPr>
+                        <a:t>-</a:t>
+                      </a:r>
+                      <a:r>
+                        <a:rPr lang="en-US" sz="2800" b="0" i="0" u="none" strike="noStrike" dirty="0" smtClean="0">
+                          <a:solidFill>
+                            <a:srgbClr val="000000"/>
+                          </a:solidFill>
+                          <a:effectLst/>
+                          <a:latin typeface="Times New Roman" panose="02020603050405020304" pitchFamily="18" charset="0"/>
+                        </a:rPr>
+                        <a:t>157.4</a:t>
+                      </a:r>
+                      <a:endParaRPr lang="en-US" sz="2800" b="0" i="0" u="none" strike="noStrike" dirty="0">
+                        <a:solidFill>
+                          <a:srgbClr val="000000"/>
+                        </a:solidFill>
+                        <a:effectLst/>
+                        <a:latin typeface="Times New Roman" panose="02020603050405020304" pitchFamily="18" charset="0"/>
+                      </a:endParaRPr>
+                    </a:p>
+                  </a:txBody>
+                  <a:tcPr marL="9525" marR="9525" marT="9525" marB="0" anchor="ctr">
+                    <a:lnL w="6350" cap="flat" cmpd="sng" algn="ctr">
+                      <a:solidFill>
+                        <a:srgbClr val="000000"/>
+                      </a:solidFill>
+                      <a:prstDash val="solid"/>
+                      <a:round/>
+                      <a:headEnd type="none" w="med" len="med"/>
+                      <a:tailEnd type="none" w="med" len="med"/>
+                    </a:lnL>
+                    <a:lnR>
+                      <a:noFill/>
+                    </a:lnR>
+                    <a:lnT>
+                      <a:noFill/>
+                    </a:lnT>
+                    <a:lnB>
+                      <a:noFill/>
+                    </a:lnB>
+                  </a:tcPr>
+                </a:tc>
+                <a:tc>
+                  <a:txBody>
+                    <a:bodyPr/>
+                    <a:lstStyle/>
+                    <a:p>
+                      <a:pPr algn="ctr" fontAlgn="ctr"/>
+                      <a:r>
+                        <a:rPr lang="en-US" sz="2800" b="0" i="0" u="none" strike="noStrike" dirty="0">
+                          <a:solidFill>
+                            <a:srgbClr val="000000"/>
+                          </a:solidFill>
+                          <a:effectLst/>
+                          <a:latin typeface="Times New Roman" panose="02020603050405020304" pitchFamily="18" charset="0"/>
+                        </a:rPr>
+                        <a:t>-</a:t>
+                      </a:r>
+                      <a:r>
+                        <a:rPr lang="en-US" sz="2800" b="0" i="0" u="none" strike="noStrike" dirty="0" smtClean="0">
+                          <a:solidFill>
+                            <a:srgbClr val="000000"/>
+                          </a:solidFill>
+                          <a:effectLst/>
+                          <a:latin typeface="Times New Roman" panose="02020603050405020304" pitchFamily="18" charset="0"/>
+                        </a:rPr>
+                        <a:t>216.4, -100.0</a:t>
+                      </a:r>
+                      <a:endParaRPr lang="en-US" sz="2800" b="0" i="0" u="none" strike="noStrike" dirty="0">
+                        <a:solidFill>
+                          <a:srgbClr val="000000"/>
+                        </a:solidFill>
+                        <a:effectLst/>
+                        <a:latin typeface="Times New Roman" panose="02020603050405020304" pitchFamily="18" charset="0"/>
+                      </a:endParaRPr>
+                    </a:p>
+                  </a:txBody>
+                  <a:tcPr marL="9525" marR="9525" marT="9525" marB="0" anchor="ctr">
+                    <a:lnL>
+                      <a:noFill/>
+                    </a:lnL>
+                    <a:lnR>
+                      <a:noFill/>
+                    </a:lnR>
+                    <a:lnT>
+                      <a:noFill/>
+                    </a:lnT>
+                    <a:lnB>
+                      <a:noFill/>
+                    </a:lnB>
+                  </a:tcPr>
+                </a:tc>
+                <a:extLst>
+                  <a:ext uri="{0D108BD9-81ED-4DB2-BD59-A6C34878D82A}">
+                    <a16:rowId xmlns:a16="http://schemas.microsoft.com/office/drawing/2014/main" val="4172455402"/>
+                  </a:ext>
+                </a:extLst>
+              </a:tr>
+            </a:tbl>
+          </a:graphicData>
+        </a:graphic>
+      </p:graphicFrame>
+      <p:sp>
+        <p:nvSpPr>
+          <p:cNvPr id="6" name="TextBox 5"/>
+          <p:cNvSpPr txBox="1"/>
+          <p:nvPr/>
+        </p:nvSpPr>
+        <p:spPr>
+          <a:xfrm>
+            <a:off x="900114" y="3667126"/>
+            <a:ext cx="10101264" cy="646331"/>
+          </a:xfrm>
+          <a:prstGeom prst="rect">
+            <a:avLst/>
+          </a:prstGeom>
+          <a:noFill/>
+        </p:spPr>
+        <p:txBody>
+          <a:bodyPr wrap="square" rtlCol="0">
+            <a:spAutoFit/>
+          </a:bodyPr>
+          <a:lstStyle/>
+          <a:p>
+            <a:r>
+              <a:rPr lang="en-US" dirty="0"/>
+              <a:t>*Adjusted for baseline, age, BMI, ART adherence at 2 year mark, race, income</a:t>
+            </a:r>
+          </a:p>
+          <a:p>
+            <a:endParaRPr lang="en-US" dirty="0"/>
+          </a:p>
+        </p:txBody>
+      </p:sp>
+      <p:sp>
+        <p:nvSpPr>
+          <p:cNvPr id="5" name="TextBox 4"/>
+          <p:cNvSpPr txBox="1"/>
+          <p:nvPr/>
+        </p:nvSpPr>
+        <p:spPr>
+          <a:xfrm>
+            <a:off x="521495" y="4354951"/>
+            <a:ext cx="11001375" cy="1077218"/>
+          </a:xfrm>
+          <a:prstGeom prst="rect">
+            <a:avLst/>
+          </a:prstGeom>
+          <a:noFill/>
+        </p:spPr>
+        <p:txBody>
+          <a:bodyPr wrap="square" rtlCol="0">
+            <a:spAutoFit/>
+          </a:bodyPr>
+          <a:lstStyle/>
+          <a:p>
+            <a:pPr marL="285750" indent="-285750">
+              <a:buFont typeface="Arial" panose="020B0604020202020204" pitchFamily="34" charset="0"/>
+              <a:buChar char="•"/>
+            </a:pPr>
+            <a:r>
+              <a:rPr lang="en-US" sz="3200" dirty="0" smtClean="0"/>
+              <a:t>Hard drug not a strong predictor of difference in log</a:t>
+            </a:r>
+            <a:r>
+              <a:rPr lang="en-US" sz="3200" baseline="-25000" dirty="0" smtClean="0"/>
+              <a:t>10</a:t>
+            </a:r>
+            <a:r>
+              <a:rPr lang="en-US" sz="3200" dirty="0" smtClean="0"/>
+              <a:t> viral load</a:t>
+            </a:r>
+          </a:p>
+          <a:p>
+            <a:pPr marL="285750" indent="-285750">
+              <a:buFont typeface="Arial" panose="020B0604020202020204" pitchFamily="34" charset="0"/>
+              <a:buChar char="•"/>
+            </a:pPr>
+            <a:r>
+              <a:rPr lang="en-US" sz="3200" dirty="0" smtClean="0"/>
+              <a:t>Hard drug much stronger predictor of difference in CD4+ count</a:t>
+            </a:r>
+            <a:endParaRPr lang="en-US" sz="3200" dirty="0"/>
+          </a:p>
+        </p:txBody>
+      </p:sp>
+    </p:spTree>
+    <p:extLst>
+      <p:ext uri="{BB962C8B-B14F-4D97-AF65-F5344CB8AC3E}">
+        <p14:creationId xmlns:p14="http://schemas.microsoft.com/office/powerpoint/2010/main" val="1203976903"/>
+      </p:ext>
+    </p:extLst>
+  </p:cSld>
+  <p:clrMapOvr>
+    <a:masterClrMapping/>
+  </p:clrMapOvr>
+</p:sld>
+</file>
+
+<file path=ppt/slides/slide7.xml><?xml version="1.0" encoding="utf-8"?>
+<p:sld xmlns:a="http://schemas.openxmlformats.org/drawingml/2006/main" xmlns:r="http://schemas.openxmlformats.org/officeDocument/2006/relationships" xmlns:p="http://schemas.openxmlformats.org/presentationml/2006/main">
+  <p:cSld>
+    <p:spTree>
+      <p:nvGrpSpPr>
+        <p:cNvPr id="1" name=""/>
+        <p:cNvGrpSpPr/>
+        <p:nvPr/>
+      </p:nvGrpSpPr>
+      <p:grpSpPr>
+        <a:xfrm>
+          <a:off x="0" y="0"/>
+          <a:ext cx="0" cy="0"/>
+          <a:chOff x="0" y="0"/>
+          <a:chExt cx="0" cy="0"/>
+        </a:xfrm>
+      </p:grpSpPr>
+      <p:sp>
+        <p:nvSpPr>
+          <p:cNvPr id="2" name="Title 1"/>
+          <p:cNvSpPr>
+            <a:spLocks noGrp="1"/>
+          </p:cNvSpPr>
+          <p:nvPr>
+            <p:ph type="title"/>
+          </p:nvPr>
+        </p:nvSpPr>
+        <p:spPr/>
+        <p:txBody>
+          <a:bodyPr/>
+          <a:lstStyle/>
+          <a:p>
+            <a:r>
+              <a:rPr lang="en-US" dirty="0" smtClean="0"/>
+              <a:t>Conclusion &amp; Limitations</a:t>
+            </a:r>
+            <a:endParaRPr lang="en-US" dirty="0"/>
+          </a:p>
+        </p:txBody>
+      </p:sp>
+      <p:sp>
+        <p:nvSpPr>
+          <p:cNvPr id="3" name="Content Placeholder 2"/>
+          <p:cNvSpPr>
+            <a:spLocks noGrp="1"/>
+          </p:cNvSpPr>
+          <p:nvPr>
+            <p:ph idx="1"/>
+          </p:nvPr>
+        </p:nvSpPr>
+        <p:spPr/>
+        <p:txBody>
+          <a:bodyPr/>
+          <a:lstStyle/>
+          <a:p>
+            <a:endParaRPr lang="en-US"/>
+          </a:p>
+        </p:txBody>
+      </p:sp>
+    </p:spTree>
+    <p:extLst>
+      <p:ext uri="{BB962C8B-B14F-4D97-AF65-F5344CB8AC3E}">
+        <p14:creationId xmlns:p14="http://schemas.microsoft.com/office/powerpoint/2010/main" val="3884508511"/>
       </p:ext>
     </p:extLst>
   </p:cSld>

</xml_diff>

<commit_message>
Edited report and presentation
</commit_message>
<xml_diff>
--- a/Project1/Reports/Project 1 Final Presentation.pptx
+++ b/Project1/Reports/Project 1 Final Presentation.pptx
@@ -3382,7 +3382,12 @@
             <p:ph type="ctrTitle"/>
           </p:nvPr>
         </p:nvSpPr>
-        <p:spPr/>
+        <p:spPr>
+          <a:xfrm>
+            <a:off x="1109980" y="753067"/>
+            <a:ext cx="9966960" cy="2926080"/>
+          </a:xfrm>
+        </p:spPr>
         <p:txBody>
           <a:bodyPr>
             <a:normAutofit fontScale="90000"/>
@@ -3391,7 +3396,15 @@
           <a:p>
             <a:r>
               <a:rPr lang="en-US" dirty="0" smtClean="0"/>
-              <a:t>Project 1: Interim Presentation</a:t>
+              <a:t>Project </a:t>
+            </a:r>
+            <a:r>
+              <a:rPr lang="en-US" dirty="0" smtClean="0"/>
+              <a:t>1 </a:t>
+            </a:r>
+            <a:r>
+              <a:rPr lang="en-US" dirty="0" smtClean="0"/>
+              <a:t>Presentation</a:t>
             </a:r>
             <a:br>
               <a:rPr lang="en-US" dirty="0" smtClean="0"/>
@@ -3581,6 +3594,13 @@
   <p:clrMapOvr>
     <a:masterClrMapping/>
   </p:clrMapOvr>
+  <p:timing>
+    <p:tnLst>
+      <p:par>
+        <p:cTn id="1" dur="indefinite" restart="never" nodeType="tmRoot"/>
+      </p:par>
+    </p:tnLst>
+  </p:timing>
 </p:sld>
 </file>
 
@@ -3677,7 +3697,15 @@
             </a:r>
             <a:r>
               <a:rPr lang="en-US" sz="2800" dirty="0"/>
-              <a:t> quality of life or laboratory value, age, BMI, alcohol use (13 or fewer vs. &gt;13 drinks), smoking status (never/former vs. current), marijuana use income level (&lt;$10,000, $10,000-$40,000, &gt;$40,000), education (HS or less, &gt;HS)</a:t>
+              <a:t> quality of life or laboratory value, age, BMI, alcohol use (13 or fewer vs. &gt;13 drinks), smoking status (never/former vs. current), marijuana </a:t>
+            </a:r>
+            <a:r>
+              <a:rPr lang="en-US" sz="2800" dirty="0" smtClean="0"/>
+              <a:t>use, </a:t>
+            </a:r>
+            <a:r>
+              <a:rPr lang="en-US" sz="2800" dirty="0"/>
+              <a:t>income level (&lt;$10,000, $10,000-$40,000, &gt;$40,000), education (HS or less, &gt;HS)</a:t>
             </a:r>
           </a:p>
           <a:p>
@@ -3799,7 +3827,7 @@
         </p:spPr>
         <p:txBody>
           <a:bodyPr>
-            <a:normAutofit lnSpcReduction="10000"/>
+            <a:normAutofit/>
           </a:bodyPr>
           <a:lstStyle/>
           <a:p>
@@ -3811,14 +3839,24 @@
           <a:p>
             <a:r>
               <a:rPr lang="en-US" sz="2400" dirty="0" smtClean="0"/>
-              <a:t>PROC MCMC, random walk Metropolis-Hastings algorithm, starting values of 0 for parameters and 1 for variance</a:t>
-            </a:r>
-          </a:p>
-          <a:p>
+              <a:t>PROC MCMC, random walk Metropolis-Hastings </a:t>
+            </a:r>
             <a:r>
               <a:rPr lang="en-US" sz="2400" dirty="0" smtClean="0"/>
-              <a:t>Vague/uninformative priors</a:t>
-            </a:r>
+              <a:t>algorithm\</a:t>
+            </a:r>
+            <a:endParaRPr lang="en-US" sz="2400" dirty="0" smtClean="0"/>
+          </a:p>
+          <a:p>
+            <a:r>
+              <a:rPr lang="en-US" sz="2400" dirty="0" smtClean="0"/>
+              <a:t>Vague/uninformative </a:t>
+            </a:r>
+            <a:r>
+              <a:rPr lang="en-US" sz="2400" dirty="0" smtClean="0"/>
+              <a:t>priors due to lack of clinical evidence otherwise</a:t>
+            </a:r>
+            <a:endParaRPr lang="en-US" sz="2400" dirty="0" smtClean="0"/>
           </a:p>
           <a:p>
             <a:pPr lvl="1"/>
@@ -3856,7 +3894,15 @@
           <a:p>
             <a:r>
               <a:rPr lang="en-US" sz="2400" dirty="0" smtClean="0"/>
-              <a:t>DIC used to compare full model and model with one covariate removed at a time</a:t>
+              <a:t>DIC used to compare full model and </a:t>
+            </a:r>
+            <a:r>
+              <a:rPr lang="en-US" sz="2400" dirty="0" smtClean="0"/>
+              <a:t>models </a:t>
+            </a:r>
+            <a:r>
+              <a:rPr lang="en-US" sz="2400" dirty="0" smtClean="0"/>
+              <a:t>with one covariate removed at a time</a:t>
             </a:r>
           </a:p>
           <a:p>
@@ -3870,7 +3916,11 @@
             <a:pPr lvl="1"/>
             <a:r>
               <a:rPr lang="en-US" sz="2400" dirty="0" smtClean="0"/>
-              <a:t>Final model removed all covariates that improved DIC when removed </a:t>
+              <a:t>Final model removed all </a:t>
+            </a:r>
+            <a:r>
+              <a:rPr lang="en-US" sz="2400" dirty="0" smtClean="0"/>
+              <a:t>covariates that didn’t improve model fit</a:t>
             </a:r>
             <a:endParaRPr lang="en-US" sz="2400" dirty="0"/>
           </a:p>
@@ -3892,6 +3942,13 @@
   <p:clrMapOvr>
     <a:masterClrMapping/>
   </p:clrMapOvr>
+  <p:timing>
+    <p:tnLst>
+      <p:par>
+        <p:cTn id="1" dur="indefinite" restart="never" nodeType="tmRoot"/>
+      </p:par>
+    </p:tnLst>
+  </p:timing>
 </p:sld>
 </file>
 
@@ -4741,8 +4798,8 @@
         </p:nvSpPr>
         <p:spPr>
           <a:xfrm>
-            <a:off x="657225" y="4362481"/>
-            <a:ext cx="10787063" cy="1938992"/>
+            <a:off x="628651" y="4116259"/>
+            <a:ext cx="10787063" cy="2185214"/>
           </a:xfrm>
           <a:prstGeom prst="rect">
             <a:avLst/>
@@ -4780,10 +4837,14 @@
               <a:buChar char="•"/>
             </a:pPr>
             <a:r>
-              <a:rPr lang="en-US" sz="2800" i="1" dirty="0" smtClean="0"/>
-              <a:t>Hard drug users have mean difference in PCS that is 3.6128 points lower than non-hard drug users (95% HPD interval:-5.9669, -0.8246)</a:t>
-            </a:r>
-            <a:endParaRPr lang="en-US" sz="2800" i="1" dirty="0"/>
+              <a:rPr lang="en-US" sz="2400" i="1" dirty="0" smtClean="0"/>
+              <a:t>Hard drug users have mean difference in PCS that is 3.6128 points lower than non-hard drug users (95% HPD interval:-5.9669, -0.8246</a:t>
+            </a:r>
+            <a:r>
+              <a:rPr lang="en-US" sz="2400" i="1" dirty="0" smtClean="0"/>
+              <a:t>), suggesting a faster decline in physical quality of life in hard drug users</a:t>
+            </a:r>
+            <a:endParaRPr lang="en-US" sz="2400" i="1" dirty="0"/>
           </a:p>
         </p:txBody>
       </p:sp>
@@ -4797,6 +4858,13 @@
   <p:clrMapOvr>
     <a:masterClrMapping/>
   </p:clrMapOvr>
+  <p:timing>
+    <p:tnLst>
+      <p:par>
+        <p:cTn id="1" dur="indefinite" restart="never" nodeType="tmRoot"/>
+      </p:par>
+    </p:tnLst>
+  </p:timing>
 </p:sld>
 </file>
 
@@ -5367,8 +5435,8 @@
         </p:nvSpPr>
         <p:spPr>
           <a:xfrm>
-            <a:off x="521495" y="4354951"/>
-            <a:ext cx="11001375" cy="1938992"/>
+            <a:off x="521495" y="4313457"/>
+            <a:ext cx="11001375" cy="2185214"/>
           </a:xfrm>
           <a:prstGeom prst="rect">
             <a:avLst/>
@@ -5414,10 +5482,14 @@
               <a:buChar char="•"/>
             </a:pPr>
             <a:r>
-              <a:rPr lang="en-US" sz="2800" i="1" dirty="0" smtClean="0"/>
-              <a:t>Hard drug users have a difference in CD4+ count that is 157.4 points lower than non-hard drug users (95% HPD: -216.4, -100.0).</a:t>
-            </a:r>
-            <a:endParaRPr lang="en-US" sz="2800" i="1" dirty="0"/>
+              <a:rPr lang="en-US" sz="2400" i="1" dirty="0" smtClean="0"/>
+              <a:t>Hard drug users have a difference in CD4+ count that is 157.4 points lower than non-hard drug users (95% HPD: -216.4, -100.0</a:t>
+            </a:r>
+            <a:r>
+              <a:rPr lang="en-US" sz="2400" i="1" dirty="0" smtClean="0"/>
+              <a:t>), suggesting a slower recovery in CD4+ levels after initiating treatment.</a:t>
+            </a:r>
+            <a:endParaRPr lang="en-US" sz="2400" i="1" dirty="0"/>
           </a:p>
         </p:txBody>
       </p:sp>
@@ -5519,7 +5591,15 @@
             <a:pPr lvl="1"/>
             <a:r>
               <a:rPr lang="en-US" sz="2800" dirty="0" smtClean="0"/>
-              <a:t>Hard drug use is strong predictor of change in aggregate physical score and CD4+ count</a:t>
+              <a:t>Hard drug use </a:t>
+            </a:r>
+            <a:r>
+              <a:rPr lang="en-US" sz="2800" dirty="0" smtClean="0"/>
+              <a:t>is a strong </a:t>
+            </a:r>
+            <a:r>
+              <a:rPr lang="en-US" sz="2800" dirty="0" smtClean="0"/>
+              <a:t>predictor of change in aggregate physical score and CD4+ count</a:t>
             </a:r>
           </a:p>
           <a:p>
@@ -5532,22 +5612,24 @@
             <a:pPr lvl="1"/>
             <a:r>
               <a:rPr lang="en-US" sz="2800" dirty="0" smtClean="0"/>
-              <a:t>Only 4 major cities represented</a:t>
+              <a:t>Small </a:t>
+            </a:r>
+            <a:r>
+              <a:rPr lang="en-US" sz="2800" dirty="0" smtClean="0"/>
+              <a:t>sample size of hard drug users (n = 39</a:t>
+            </a:r>
+            <a:r>
+              <a:rPr lang="en-US" sz="2800" dirty="0" smtClean="0"/>
+              <a:t>)</a:t>
             </a:r>
           </a:p>
           <a:p>
             <a:pPr lvl="1"/>
             <a:r>
               <a:rPr lang="en-US" sz="2800" dirty="0" smtClean="0"/>
-              <a:t>Did not account for city/region in analysis</a:t>
-            </a:r>
-          </a:p>
-          <a:p>
-            <a:pPr lvl="1"/>
-            <a:r>
-              <a:rPr lang="en-US" sz="2800" dirty="0" smtClean="0"/>
-              <a:t>Small sample size of hard drug users (n = 39)</a:t>
-            </a:r>
+              <a:t>Only looking at baseline and 2 year mark in study, so patterns may not be generalizable to entire follow-up period</a:t>
+            </a:r>
+            <a:endParaRPr lang="en-US" sz="2800" dirty="0" smtClean="0"/>
           </a:p>
           <a:p>
             <a:pPr lvl="1"/>

</xml_diff>